<commit_message>
addition of blog, presentation and Python code
</commit_message>
<xml_diff>
--- a/Results_presentation.pptx
+++ b/Results_presentation.pptx
@@ -27,6 +27,7 @@
     <p:sldId id="276" r:id="rId21"/>
     <p:sldId id="277" r:id="rId22"/>
     <p:sldId id="278" r:id="rId23"/>
+    <p:sldId id="279" r:id="rId24"/>
   </p:sldIdLst>
   <p:sldSz cx="12192000" cy="6858000"/>
   <p:notesSz cx="6858000" cy="9144000"/>
@@ -878,7 +879,7 @@
           <a:p>
             <a:fld id="{947F76FC-2865-46AB-BCAF-868BAF616D6A}" type="datetimeFigureOut">
               <a:rPr lang="en-GB" smtClean="0"/>
-              <a:t>19/08/2024</a:t>
+              <a:t>21/08/2024</a:t>
             </a:fld>
             <a:endParaRPr lang="en-GB"/>
           </a:p>
@@ -1129,7 +1130,7 @@
           <a:p>
             <a:fld id="{947F76FC-2865-46AB-BCAF-868BAF616D6A}" type="datetimeFigureOut">
               <a:rPr lang="en-GB" smtClean="0"/>
-              <a:t>19/08/2024</a:t>
+              <a:t>21/08/2024</a:t>
             </a:fld>
             <a:endParaRPr lang="en-GB"/>
           </a:p>
@@ -1443,7 +1444,7 @@
           <a:p>
             <a:fld id="{947F76FC-2865-46AB-BCAF-868BAF616D6A}" type="datetimeFigureOut">
               <a:rPr lang="en-GB" smtClean="0"/>
-              <a:t>19/08/2024</a:t>
+              <a:t>21/08/2024</a:t>
             </a:fld>
             <a:endParaRPr lang="en-GB"/>
           </a:p>
@@ -1776,7 +1777,7 @@
           <a:p>
             <a:fld id="{947F76FC-2865-46AB-BCAF-868BAF616D6A}" type="datetimeFigureOut">
               <a:rPr lang="en-GB" smtClean="0"/>
-              <a:t>19/08/2024</a:t>
+              <a:t>21/08/2024</a:t>
             </a:fld>
             <a:endParaRPr lang="en-GB"/>
           </a:p>
@@ -2090,7 +2091,7 @@
           <a:p>
             <a:fld id="{947F76FC-2865-46AB-BCAF-868BAF616D6A}" type="datetimeFigureOut">
               <a:rPr lang="en-GB" smtClean="0"/>
-              <a:t>19/08/2024</a:t>
+              <a:t>21/08/2024</a:t>
             </a:fld>
             <a:endParaRPr lang="en-GB"/>
           </a:p>
@@ -2483,7 +2484,7 @@
           <a:p>
             <a:fld id="{947F76FC-2865-46AB-BCAF-868BAF616D6A}" type="datetimeFigureOut">
               <a:rPr lang="en-GB" smtClean="0"/>
-              <a:t>19/08/2024</a:t>
+              <a:t>21/08/2024</a:t>
             </a:fld>
             <a:endParaRPr lang="en-GB"/>
           </a:p>
@@ -2653,7 +2654,7 @@
           <a:p>
             <a:fld id="{947F76FC-2865-46AB-BCAF-868BAF616D6A}" type="datetimeFigureOut">
               <a:rPr lang="en-GB" smtClean="0"/>
-              <a:t>19/08/2024</a:t>
+              <a:t>21/08/2024</a:t>
             </a:fld>
             <a:endParaRPr lang="en-GB"/>
           </a:p>
@@ -2833,7 +2834,7 @@
           <a:p>
             <a:fld id="{947F76FC-2865-46AB-BCAF-868BAF616D6A}" type="datetimeFigureOut">
               <a:rPr lang="en-GB" smtClean="0"/>
-              <a:t>19/08/2024</a:t>
+              <a:t>21/08/2024</a:t>
             </a:fld>
             <a:endParaRPr lang="en-GB"/>
           </a:p>
@@ -3003,7 +3004,7 @@
           <a:p>
             <a:fld id="{947F76FC-2865-46AB-BCAF-868BAF616D6A}" type="datetimeFigureOut">
               <a:rPr lang="en-GB" smtClean="0"/>
-              <a:t>19/08/2024</a:t>
+              <a:t>21/08/2024</a:t>
             </a:fld>
             <a:endParaRPr lang="en-GB"/>
           </a:p>
@@ -3250,7 +3251,7 @@
           <a:p>
             <a:fld id="{947F76FC-2865-46AB-BCAF-868BAF616D6A}" type="datetimeFigureOut">
               <a:rPr lang="en-GB" smtClean="0"/>
-              <a:t>19/08/2024</a:t>
+              <a:t>21/08/2024</a:t>
             </a:fld>
             <a:endParaRPr lang="en-GB"/>
           </a:p>
@@ -3482,7 +3483,7 @@
           <a:p>
             <a:fld id="{947F76FC-2865-46AB-BCAF-868BAF616D6A}" type="datetimeFigureOut">
               <a:rPr lang="en-GB" smtClean="0"/>
-              <a:t>19/08/2024</a:t>
+              <a:t>21/08/2024</a:t>
             </a:fld>
             <a:endParaRPr lang="en-GB"/>
           </a:p>
@@ -3856,7 +3857,7 @@
           <a:p>
             <a:fld id="{947F76FC-2865-46AB-BCAF-868BAF616D6A}" type="datetimeFigureOut">
               <a:rPr lang="en-GB" smtClean="0"/>
-              <a:t>19/08/2024</a:t>
+              <a:t>21/08/2024</a:t>
             </a:fld>
             <a:endParaRPr lang="en-GB"/>
           </a:p>
@@ -3979,7 +3980,7 @@
           <a:p>
             <a:fld id="{947F76FC-2865-46AB-BCAF-868BAF616D6A}" type="datetimeFigureOut">
               <a:rPr lang="en-GB" smtClean="0"/>
-              <a:t>19/08/2024</a:t>
+              <a:t>21/08/2024</a:t>
             </a:fld>
             <a:endParaRPr lang="en-GB"/>
           </a:p>
@@ -4074,7 +4075,7 @@
           <a:p>
             <a:fld id="{947F76FC-2865-46AB-BCAF-868BAF616D6A}" type="datetimeFigureOut">
               <a:rPr lang="en-GB" smtClean="0"/>
-              <a:t>19/08/2024</a:t>
+              <a:t>21/08/2024</a:t>
             </a:fld>
             <a:endParaRPr lang="en-GB"/>
           </a:p>
@@ -4329,7 +4330,7 @@
           <a:p>
             <a:fld id="{947F76FC-2865-46AB-BCAF-868BAF616D6A}" type="datetimeFigureOut">
               <a:rPr lang="en-GB" smtClean="0"/>
-              <a:t>19/08/2024</a:t>
+              <a:t>21/08/2024</a:t>
             </a:fld>
             <a:endParaRPr lang="en-GB"/>
           </a:p>
@@ -4634,7 +4635,7 @@
           <a:p>
             <a:fld id="{947F76FC-2865-46AB-BCAF-868BAF616D6A}" type="datetimeFigureOut">
               <a:rPr lang="en-GB" smtClean="0"/>
-              <a:t>19/08/2024</a:t>
+              <a:t>21/08/2024</a:t>
             </a:fld>
             <a:endParaRPr lang="en-GB"/>
           </a:p>
@@ -5336,7 +5337,7 @@
           <a:p>
             <a:fld id="{947F76FC-2865-46AB-BCAF-868BAF616D6A}" type="datetimeFigureOut">
               <a:rPr lang="en-GB" smtClean="0"/>
-              <a:t>19/08/2024</a:t>
+              <a:t>21/08/2024</a:t>
             </a:fld>
             <a:endParaRPr lang="en-GB"/>
           </a:p>
@@ -6001,7 +6002,12 @@
             <p:ph type="title"/>
           </p:nvPr>
         </p:nvSpPr>
-        <p:spPr/>
+        <p:spPr>
+          <a:xfrm>
+            <a:off x="677334" y="462120"/>
+            <a:ext cx="8596668" cy="1320800"/>
+          </a:xfrm>
+        </p:spPr>
         <p:txBody>
           <a:bodyPr/>
           <a:lstStyle/>
@@ -6099,7 +6105,12 @@
             <p:ph type="title"/>
           </p:nvPr>
         </p:nvSpPr>
-        <p:spPr/>
+        <p:spPr>
+          <a:xfrm>
+            <a:off x="677334" y="462120"/>
+            <a:ext cx="8596668" cy="1320800"/>
+          </a:xfrm>
+        </p:spPr>
         <p:txBody>
           <a:bodyPr/>
           <a:lstStyle/>
@@ -6946,7 +6957,7 @@
         <p:spPr>
           <a:xfrm>
             <a:off x="806789" y="4048269"/>
-            <a:ext cx="6098458" cy="646331"/>
+            <a:ext cx="8128002" cy="1200329"/>
           </a:xfrm>
           <a:prstGeom prst="rect">
             <a:avLst/>
@@ -6967,12 +6978,21 @@
               <a:buChar char="Ø"/>
             </a:pPr>
             <a:r>
-              <a:rPr lang="en-GB" dirty="0">
-                <a:solidFill>
-                  <a:srgbClr val="FF0000"/>
-                </a:solidFill>
-              </a:rPr>
-              <a:t>The following table highlights the biometrics of the competitors</a:t>
+              <a:rPr lang="en-GB" dirty="0"/>
+              <a:t>Marathon Olympians were older, shorter and lighter than the average Olympian which also led to a lower BMI</a:t>
+            </a:r>
+          </a:p>
+          <a:p>
+            <a:pPr marL="285750" indent="-285750">
+              <a:buClr>
+                <a:schemeClr val="accent1"/>
+              </a:buClr>
+              <a:buFont typeface="Wingdings" panose="05000000000000000000" pitchFamily="2" charset="2"/>
+              <a:buChar char="Ø"/>
+            </a:pPr>
+            <a:r>
+              <a:rPr lang="en-GB" dirty="0"/>
+              <a:t>This is likely because marathons require endurance rather than power so smaller athletes are at an advantage</a:t>
             </a:r>
           </a:p>
         </p:txBody>
@@ -7023,7 +7043,12 @@
             <p:ph type="title"/>
           </p:nvPr>
         </p:nvSpPr>
-        <p:spPr/>
+        <p:spPr>
+          <a:xfrm>
+            <a:off x="677334" y="462120"/>
+            <a:ext cx="8596668" cy="1320800"/>
+          </a:xfrm>
+        </p:spPr>
         <p:txBody>
           <a:bodyPr/>
           <a:lstStyle/>
@@ -7121,7 +7146,12 @@
             <p:ph type="title"/>
           </p:nvPr>
         </p:nvSpPr>
-        <p:spPr/>
+        <p:spPr>
+          <a:xfrm>
+            <a:off x="677334" y="462120"/>
+            <a:ext cx="8596668" cy="1320800"/>
+          </a:xfrm>
+        </p:spPr>
         <p:txBody>
           <a:bodyPr/>
           <a:lstStyle/>
@@ -7967,8 +7997,8 @@
         </p:nvSpPr>
         <p:spPr>
           <a:xfrm>
-            <a:off x="806789" y="4048269"/>
-            <a:ext cx="6098458" cy="646331"/>
+            <a:off x="806788" y="4048269"/>
+            <a:ext cx="8128001" cy="1477328"/>
           </a:xfrm>
           <a:prstGeom prst="rect">
             <a:avLst/>
@@ -7989,12 +8019,21 @@
               <a:buChar char="Ø"/>
             </a:pPr>
             <a:r>
-              <a:rPr lang="en-GB" dirty="0">
-                <a:solidFill>
-                  <a:srgbClr val="FF0000"/>
-                </a:solidFill>
-              </a:rPr>
-              <a:t>The following table highlights the biometrics of the competitors</a:t>
+              <a:rPr lang="en-GB" dirty="0"/>
+              <a:t>Shot put athletes were found to be older, taller and heavier than the average Olympian with a higher BMI</a:t>
+            </a:r>
+          </a:p>
+          <a:p>
+            <a:pPr marL="285750" indent="-285750">
+              <a:buClr>
+                <a:schemeClr val="accent1"/>
+              </a:buClr>
+              <a:buFont typeface="Wingdings" panose="05000000000000000000" pitchFamily="2" charset="2"/>
+              <a:buChar char="Ø"/>
+            </a:pPr>
+            <a:r>
+              <a:rPr lang="en-GB" dirty="0"/>
+              <a:t>This is because shot put requires a lot of strength and power and therefore a more muscular body. In addition, a greater height enables a longer flight time. </a:t>
             </a:r>
           </a:p>
         </p:txBody>
@@ -8045,7 +8084,12 @@
             <p:ph type="title"/>
           </p:nvPr>
         </p:nvSpPr>
-        <p:spPr/>
+        <p:spPr>
+          <a:xfrm>
+            <a:off x="677334" y="462120"/>
+            <a:ext cx="8596668" cy="1320800"/>
+          </a:xfrm>
+        </p:spPr>
         <p:txBody>
           <a:bodyPr/>
           <a:lstStyle/>
@@ -8143,7 +8187,12 @@
             <p:ph type="title"/>
           </p:nvPr>
         </p:nvSpPr>
-        <p:spPr/>
+        <p:spPr>
+          <a:xfrm>
+            <a:off x="677334" y="462120"/>
+            <a:ext cx="8596668" cy="1320800"/>
+          </a:xfrm>
+        </p:spPr>
         <p:txBody>
           <a:bodyPr/>
           <a:lstStyle/>
@@ -8990,7 +9039,7 @@
         <p:spPr>
           <a:xfrm>
             <a:off x="806789" y="4048269"/>
-            <a:ext cx="6098458" cy="646331"/>
+            <a:ext cx="8128002" cy="1477328"/>
           </a:xfrm>
           <a:prstGeom prst="rect">
             <a:avLst/>
@@ -9011,13 +9060,34 @@
               <a:buChar char="Ø"/>
             </a:pPr>
             <a:r>
-              <a:rPr lang="en-GB" dirty="0">
-                <a:solidFill>
-                  <a:srgbClr val="FF0000"/>
-                </a:solidFill>
-              </a:rPr>
-              <a:t>The following table highlights the biometrics of the competitors</a:t>
-            </a:r>
+              <a:rPr lang="en-GB" dirty="0"/>
+              <a:t>High jumpers are younger, taller and have a lower BMI that the average Olympian</a:t>
+            </a:r>
+          </a:p>
+          <a:p>
+            <a:pPr marL="285750" indent="-285750">
+              <a:buClr>
+                <a:schemeClr val="accent1"/>
+              </a:buClr>
+              <a:buFont typeface="Wingdings" panose="05000000000000000000" pitchFamily="2" charset="2"/>
+              <a:buChar char="Ø"/>
+            </a:pPr>
+            <a:r>
+              <a:rPr lang="en-GB" dirty="0"/>
+              <a:t>Taller athletes have an advantage in the high jump as their centre of gravity is higher.</a:t>
+            </a:r>
+          </a:p>
+          <a:p>
+            <a:pPr>
+              <a:buClr>
+                <a:schemeClr val="accent1"/>
+              </a:buClr>
+            </a:pPr>
+            <a:endParaRPr lang="en-GB" dirty="0">
+              <a:solidFill>
+                <a:srgbClr val="FF0000"/>
+              </a:solidFill>
+            </a:endParaRPr>
           </a:p>
         </p:txBody>
       </p:sp>
@@ -9067,7 +9137,12 @@
             <p:ph type="title"/>
           </p:nvPr>
         </p:nvSpPr>
-        <p:spPr/>
+        <p:spPr>
+          <a:xfrm>
+            <a:off x="677334" y="462120"/>
+            <a:ext cx="8596668" cy="1320800"/>
+          </a:xfrm>
+        </p:spPr>
         <p:txBody>
           <a:bodyPr/>
           <a:lstStyle/>
@@ -9165,7 +9240,12 @@
             <p:ph type="title"/>
           </p:nvPr>
         </p:nvSpPr>
-        <p:spPr/>
+        <p:spPr>
+          <a:xfrm>
+            <a:off x="677334" y="462120"/>
+            <a:ext cx="8596668" cy="1320800"/>
+          </a:xfrm>
+        </p:spPr>
         <p:txBody>
           <a:bodyPr/>
           <a:lstStyle/>
@@ -9274,7 +9354,7 @@
         </p:blipFill>
         <p:spPr>
           <a:xfrm>
-            <a:off x="677334" y="1451715"/>
+            <a:off x="677334" y="1628691"/>
             <a:ext cx="8428166" cy="5290589"/>
           </a:xfrm>
           <a:prstGeom prst="rect">
@@ -9298,7 +9378,12 @@
             <p:ph type="title"/>
           </p:nvPr>
         </p:nvSpPr>
-        <p:spPr/>
+        <p:spPr>
+          <a:xfrm>
+            <a:off x="677334" y="462120"/>
+            <a:ext cx="8596668" cy="1320800"/>
+          </a:xfrm>
+        </p:spPr>
         <p:txBody>
           <a:bodyPr/>
           <a:lstStyle/>
@@ -9328,7 +9413,7 @@
         </p:nvSpPr>
         <p:spPr>
           <a:xfrm>
-            <a:off x="2232197" y="1676893"/>
+            <a:off x="2232197" y="1853869"/>
             <a:ext cx="879989" cy="430887"/>
           </a:xfrm>
           <a:prstGeom prst="rect">
@@ -9363,7 +9448,7 @@
         </p:nvSpPr>
         <p:spPr>
           <a:xfrm>
-            <a:off x="1391248" y="3665441"/>
+            <a:off x="1391248" y="3842417"/>
             <a:ext cx="879989" cy="430887"/>
           </a:xfrm>
           <a:prstGeom prst="rect">
@@ -9398,7 +9483,7 @@
         </p:nvSpPr>
         <p:spPr>
           <a:xfrm>
-            <a:off x="2271237" y="3108151"/>
+            <a:off x="2271237" y="3285127"/>
             <a:ext cx="685800" cy="430887"/>
           </a:xfrm>
           <a:prstGeom prst="rect">
@@ -9433,7 +9518,7 @@
         </p:nvSpPr>
         <p:spPr>
           <a:xfrm>
-            <a:off x="2883571" y="4811837"/>
+            <a:off x="2883571" y="4988813"/>
             <a:ext cx="879989" cy="430887"/>
           </a:xfrm>
           <a:prstGeom prst="rect">
@@ -9468,7 +9553,7 @@
         </p:nvSpPr>
         <p:spPr>
           <a:xfrm>
-            <a:off x="3519816" y="3676705"/>
+            <a:off x="3519816" y="3853681"/>
             <a:ext cx="532020" cy="430887"/>
           </a:xfrm>
           <a:prstGeom prst="rect">
@@ -9503,7 +9588,7 @@
         </p:nvSpPr>
         <p:spPr>
           <a:xfrm>
-            <a:off x="4257246" y="5039270"/>
+            <a:off x="4257246" y="5216246"/>
             <a:ext cx="715025" cy="430887"/>
           </a:xfrm>
           <a:prstGeom prst="rect">
@@ -9538,7 +9623,7 @@
         </p:nvSpPr>
         <p:spPr>
           <a:xfrm>
-            <a:off x="4801194" y="4975398"/>
+            <a:off x="4801194" y="5152374"/>
             <a:ext cx="1371601" cy="430887"/>
           </a:xfrm>
           <a:prstGeom prst="rect">
@@ -9573,7 +9658,7 @@
         </p:nvSpPr>
         <p:spPr>
           <a:xfrm>
-            <a:off x="5292489" y="3762882"/>
+            <a:off x="5292489" y="3939858"/>
             <a:ext cx="970529" cy="430887"/>
           </a:xfrm>
           <a:prstGeom prst="rect">
@@ -9608,7 +9693,7 @@
         </p:nvSpPr>
         <p:spPr>
           <a:xfrm>
-            <a:off x="6388917" y="2621568"/>
+            <a:off x="6388917" y="2798544"/>
             <a:ext cx="572321" cy="430887"/>
           </a:xfrm>
           <a:prstGeom prst="rect">
@@ -9643,7 +9728,7 @@
         </p:nvSpPr>
         <p:spPr>
           <a:xfrm>
-            <a:off x="6899374" y="3729337"/>
+            <a:off x="6899374" y="3906313"/>
             <a:ext cx="720504" cy="430887"/>
           </a:xfrm>
           <a:prstGeom prst="rect">
@@ -9678,7 +9763,7 @@
         </p:nvSpPr>
         <p:spPr>
           <a:xfrm>
-            <a:off x="7157062" y="4592024"/>
+            <a:off x="7157062" y="4769000"/>
             <a:ext cx="836710" cy="430887"/>
           </a:xfrm>
           <a:prstGeom prst="rect">
@@ -9713,7 +9798,7 @@
         </p:nvSpPr>
         <p:spPr>
           <a:xfrm>
-            <a:off x="8131281" y="4470346"/>
+            <a:off x="8131281" y="4647322"/>
             <a:ext cx="836710" cy="430887"/>
           </a:xfrm>
           <a:prstGeom prst="rect">
@@ -9731,6 +9816,60 @@
               <a:rPr lang="en-GB" sz="1100" dirty="0"/>
               <a:t>London UK</a:t>
             </a:r>
+          </a:p>
+        </p:txBody>
+      </p:sp>
+      <p:sp>
+        <p:nvSpPr>
+          <p:cNvPr id="3" name="TextBox 2">
+            <a:extLst>
+              <a:ext uri="{FF2B5EF4-FFF2-40B4-BE49-F238E27FC236}">
+                <a16:creationId xmlns:a16="http://schemas.microsoft.com/office/drawing/2014/main" id="{77C5CD35-5BA3-3889-6954-026266A623EB}"/>
+              </a:ext>
+            </a:extLst>
+          </p:cNvPr>
+          <p:cNvSpPr txBox="1"/>
+          <p:nvPr/>
+        </p:nvSpPr>
+        <p:spPr>
+          <a:xfrm>
+            <a:off x="677334" y="1237571"/>
+            <a:ext cx="8128002" cy="646331"/>
+          </a:xfrm>
+          <a:prstGeom prst="rect">
+            <a:avLst/>
+          </a:prstGeom>
+          <a:noFill/>
+        </p:spPr>
+        <p:txBody>
+          <a:bodyPr wrap="square">
+            <a:spAutoFit/>
+          </a:bodyPr>
+          <a:lstStyle/>
+          <a:p>
+            <a:pPr marL="285750" indent="-285750">
+              <a:buClr>
+                <a:schemeClr val="accent1"/>
+              </a:buClr>
+              <a:buFont typeface="Wingdings" panose="05000000000000000000" pitchFamily="2" charset="2"/>
+              <a:buChar char="Ø"/>
+            </a:pPr>
+            <a:r>
+              <a:rPr lang="en-GB" dirty="0"/>
+              <a:t>A peak in medal count was observed for the hosting country</a:t>
+            </a:r>
+          </a:p>
+          <a:p>
+            <a:pPr>
+              <a:buClr>
+                <a:schemeClr val="accent1"/>
+              </a:buClr>
+            </a:pPr>
+            <a:endParaRPr lang="en-GB" dirty="0">
+              <a:solidFill>
+                <a:srgbClr val="FF0000"/>
+              </a:solidFill>
+            </a:endParaRPr>
           </a:p>
         </p:txBody>
       </p:sp>
@@ -9791,7 +9930,7 @@
         </p:blipFill>
         <p:spPr>
           <a:xfrm>
-            <a:off x="740973" y="1451715"/>
+            <a:off x="740973" y="1672935"/>
             <a:ext cx="8462596" cy="5166851"/>
           </a:xfrm>
           <a:prstGeom prst="rect">
@@ -9815,7 +9954,12 @@
             <p:ph type="title"/>
           </p:nvPr>
         </p:nvSpPr>
-        <p:spPr/>
+        <p:spPr>
+          <a:xfrm>
+            <a:off x="677334" y="462120"/>
+            <a:ext cx="8596668" cy="1320800"/>
+          </a:xfrm>
+        </p:spPr>
         <p:txBody>
           <a:bodyPr/>
           <a:lstStyle/>
@@ -9845,7 +9989,7 @@
         </p:nvSpPr>
         <p:spPr>
           <a:xfrm>
-            <a:off x="2108442" y="1655949"/>
+            <a:off x="2108442" y="1877169"/>
             <a:ext cx="879989" cy="430887"/>
           </a:xfrm>
           <a:prstGeom prst="rect">
@@ -9880,7 +10024,7 @@
         </p:nvSpPr>
         <p:spPr>
           <a:xfrm>
-            <a:off x="1399174" y="3932285"/>
+            <a:off x="1399174" y="4153505"/>
             <a:ext cx="879989" cy="430887"/>
           </a:xfrm>
           <a:prstGeom prst="rect">
@@ -9915,7 +10059,7 @@
         </p:nvSpPr>
         <p:spPr>
           <a:xfrm>
-            <a:off x="2360540" y="2851541"/>
+            <a:off x="2360540" y="3072761"/>
             <a:ext cx="685800" cy="430887"/>
           </a:xfrm>
           <a:prstGeom prst="rect">
@@ -9950,7 +10094,7 @@
         </p:nvSpPr>
         <p:spPr>
           <a:xfrm>
-            <a:off x="3069028" y="4823826"/>
+            <a:off x="3069028" y="5045046"/>
             <a:ext cx="879989" cy="430887"/>
           </a:xfrm>
           <a:prstGeom prst="rect">
@@ -9985,7 +10129,7 @@
         </p:nvSpPr>
         <p:spPr>
           <a:xfrm>
-            <a:off x="3554164" y="3338689"/>
+            <a:off x="3554164" y="3559909"/>
             <a:ext cx="532020" cy="430887"/>
           </a:xfrm>
           <a:prstGeom prst="rect">
@@ -10020,7 +10164,7 @@
         </p:nvSpPr>
         <p:spPr>
           <a:xfrm>
-            <a:off x="4196403" y="4998606"/>
+            <a:off x="4196403" y="5219826"/>
             <a:ext cx="715025" cy="430887"/>
           </a:xfrm>
           <a:prstGeom prst="rect">
@@ -10055,7 +10199,7 @@
         </p:nvSpPr>
         <p:spPr>
           <a:xfrm>
-            <a:off x="4724399" y="4861782"/>
+            <a:off x="4724399" y="5083002"/>
             <a:ext cx="1371601" cy="430887"/>
           </a:xfrm>
           <a:prstGeom prst="rect">
@@ -10090,7 +10234,7 @@
         </p:nvSpPr>
         <p:spPr>
           <a:xfrm>
-            <a:off x="5315683" y="3298450"/>
+            <a:off x="5315683" y="3519670"/>
             <a:ext cx="970529" cy="430887"/>
           </a:xfrm>
           <a:prstGeom prst="rect">
@@ -10125,7 +10269,7 @@
         </p:nvSpPr>
         <p:spPr>
           <a:xfrm>
-            <a:off x="6096000" y="1757109"/>
+            <a:off x="6096000" y="1978329"/>
             <a:ext cx="572321" cy="430887"/>
           </a:xfrm>
           <a:prstGeom prst="rect">
@@ -10160,7 +10304,7 @@
         </p:nvSpPr>
         <p:spPr>
           <a:xfrm>
-            <a:off x="7024386" y="3306048"/>
+            <a:off x="7024386" y="3527268"/>
             <a:ext cx="720504" cy="430887"/>
           </a:xfrm>
           <a:prstGeom prst="rect">
@@ -10195,7 +10339,7 @@
         </p:nvSpPr>
         <p:spPr>
           <a:xfrm>
-            <a:off x="7262752" y="4630180"/>
+            <a:off x="7262752" y="4851400"/>
             <a:ext cx="836710" cy="430887"/>
           </a:xfrm>
           <a:prstGeom prst="rect">
@@ -10230,7 +10374,7 @@
         </p:nvSpPr>
         <p:spPr>
           <a:xfrm>
-            <a:off x="8099462" y="4059039"/>
+            <a:off x="8099462" y="4280259"/>
             <a:ext cx="836710" cy="430887"/>
           </a:xfrm>
           <a:prstGeom prst="rect">
@@ -10248,6 +10392,60 @@
               <a:rPr lang="en-GB" sz="1100" dirty="0"/>
               <a:t>London UK</a:t>
             </a:r>
+          </a:p>
+        </p:txBody>
+      </p:sp>
+      <p:sp>
+        <p:nvSpPr>
+          <p:cNvPr id="3" name="TextBox 2">
+            <a:extLst>
+              <a:ext uri="{FF2B5EF4-FFF2-40B4-BE49-F238E27FC236}">
+                <a16:creationId xmlns:a16="http://schemas.microsoft.com/office/drawing/2014/main" id="{D0F7C355-4B8C-44C6-16BA-CE0B192FB85A}"/>
+              </a:ext>
+            </a:extLst>
+          </p:cNvPr>
+          <p:cNvSpPr txBox="1"/>
+          <p:nvPr/>
+        </p:nvSpPr>
+        <p:spPr>
+          <a:xfrm>
+            <a:off x="677334" y="1237571"/>
+            <a:ext cx="8128002" cy="646331"/>
+          </a:xfrm>
+          <a:prstGeom prst="rect">
+            <a:avLst/>
+          </a:prstGeom>
+          <a:noFill/>
+        </p:spPr>
+        <p:txBody>
+          <a:bodyPr wrap="square">
+            <a:spAutoFit/>
+          </a:bodyPr>
+          <a:lstStyle/>
+          <a:p>
+            <a:pPr marL="285750" indent="-285750">
+              <a:buClr>
+                <a:schemeClr val="accent1"/>
+              </a:buClr>
+              <a:buFont typeface="Wingdings" panose="05000000000000000000" pitchFamily="2" charset="2"/>
+              <a:buChar char="Ø"/>
+            </a:pPr>
+            <a:r>
+              <a:rPr lang="en-GB" dirty="0"/>
+              <a:t>A peak in gold medal count was observed for the hosting country</a:t>
+            </a:r>
+          </a:p>
+          <a:p>
+            <a:pPr>
+              <a:buClr>
+                <a:schemeClr val="accent1"/>
+              </a:buClr>
+            </a:pPr>
+            <a:endParaRPr lang="en-GB" dirty="0">
+              <a:solidFill>
+                <a:srgbClr val="FF0000"/>
+              </a:solidFill>
+            </a:endParaRPr>
           </a:p>
         </p:txBody>
       </p:sp>
@@ -10299,7 +10497,7 @@
         </p:nvSpPr>
         <p:spPr>
           <a:xfrm>
-            <a:off x="677334" y="609600"/>
+            <a:off x="677334" y="462120"/>
             <a:ext cx="8596668" cy="732503"/>
           </a:xfrm>
         </p:spPr>
@@ -10357,11 +10555,11 @@
                   <a:srgbClr val="FFFFFF"/>
                 </a:highlight>
               </a:rPr>
-              <a:t>The modern Olympics see athletes competing in a wide range of sports. Visually there are numerous differences between athletes such as slight jumpers and powerful weightlifters but what makes Olympians? </a:t>
-            </a:r>
-          </a:p>
-          <a:p>
-            <a:pPr>
+              <a:t>The modern Olympics sees athletes competing in a wide range of sports</a:t>
+            </a:r>
+          </a:p>
+          <a:p>
+            <a:pPr algn="l">
               <a:buFont typeface="Wingdings" panose="05000000000000000000" pitchFamily="2" charset="2"/>
               <a:buChar char="Ø"/>
             </a:pPr>
@@ -10372,7 +10570,39 @@
                   <a:srgbClr val="FFFFFF"/>
                 </a:highlight>
               </a:rPr>
-              <a:t>This project will aim to investigate various factors that contribute to Olympians and medal winners such as:</a:t>
+              <a:t>Visually, there are numerous differences between athletes such as slight jumpers and powerful weightlifters but what makes Olympians? </a:t>
+            </a:r>
+          </a:p>
+          <a:p>
+            <a:pPr>
+              <a:buFont typeface="Wingdings" panose="05000000000000000000" pitchFamily="2" charset="2"/>
+              <a:buChar char="Ø"/>
+            </a:pPr>
+            <a:r>
+              <a:rPr lang="en-GB" sz="1900" b="0" i="0" dirty="0">
+                <a:effectLst/>
+                <a:highlight>
+                  <a:srgbClr val="FFFFFF"/>
+                </a:highlight>
+              </a:rPr>
+              <a:t>This project aims to investigate various </a:t>
+            </a:r>
+            <a:r>
+              <a:rPr lang="en-GB" sz="1900" dirty="0">
+                <a:highlight>
+                  <a:srgbClr val="FFFFFF"/>
+                </a:highlight>
+              </a:rPr>
+              <a:t>factors</a:t>
+            </a:r>
+            <a:r>
+              <a:rPr lang="en-GB" sz="1900" b="0" i="0" dirty="0">
+                <a:effectLst/>
+                <a:highlight>
+                  <a:srgbClr val="FFFFFF"/>
+                </a:highlight>
+              </a:rPr>
+              <a:t> that contribute to Olympians and medal winners such as:</a:t>
             </a:r>
           </a:p>
           <a:p>
@@ -10572,7 +10802,12 @@
             <p:ph type="title"/>
           </p:nvPr>
         </p:nvSpPr>
-        <p:spPr/>
+        <p:spPr>
+          <a:xfrm>
+            <a:off x="677334" y="462120"/>
+            <a:ext cx="8596668" cy="1320800"/>
+          </a:xfrm>
+        </p:spPr>
         <p:txBody>
           <a:bodyPr/>
           <a:lstStyle/>
@@ -10616,8 +10851,8 @@
         </p:blipFill>
         <p:spPr>
           <a:xfrm>
-            <a:off x="1040575" y="1491226"/>
-            <a:ext cx="7469245" cy="4481547"/>
+            <a:off x="1620676" y="2492349"/>
+            <a:ext cx="6713798" cy="4028279"/>
           </a:xfrm>
           <a:prstGeom prst="rect">
             <a:avLst/>
@@ -10638,7 +10873,7 @@
         </p:nvSpPr>
         <p:spPr>
           <a:xfrm>
-            <a:off x="1796022" y="5883959"/>
+            <a:off x="1796022" y="6400159"/>
             <a:ext cx="2979175" cy="369332"/>
           </a:xfrm>
           <a:prstGeom prst="rect">
@@ -10673,7 +10908,7 @@
         </p:nvSpPr>
         <p:spPr>
           <a:xfrm>
-            <a:off x="5355299" y="5879068"/>
+            <a:off x="5355299" y="6395268"/>
             <a:ext cx="2979175" cy="369332"/>
           </a:xfrm>
           <a:prstGeom prst="rect">
@@ -10691,6 +10926,86 @@
               <a:rPr lang="en-GB" dirty="0"/>
               <a:t>Pearson correlation = 0.59</a:t>
             </a:r>
+          </a:p>
+        </p:txBody>
+      </p:sp>
+      <p:sp>
+        <p:nvSpPr>
+          <p:cNvPr id="3" name="TextBox 2">
+            <a:extLst>
+              <a:ext uri="{FF2B5EF4-FFF2-40B4-BE49-F238E27FC236}">
+                <a16:creationId xmlns:a16="http://schemas.microsoft.com/office/drawing/2014/main" id="{DEDD41E5-98F2-424F-C2AF-E1EA3438C10F}"/>
+              </a:ext>
+            </a:extLst>
+          </p:cNvPr>
+          <p:cNvSpPr txBox="1"/>
+          <p:nvPr/>
+        </p:nvSpPr>
+        <p:spPr>
+          <a:xfrm>
+            <a:off x="677334" y="1237571"/>
+            <a:ext cx="8128002" cy="1477328"/>
+          </a:xfrm>
+          <a:prstGeom prst="rect">
+            <a:avLst/>
+          </a:prstGeom>
+          <a:noFill/>
+        </p:spPr>
+        <p:txBody>
+          <a:bodyPr wrap="square">
+            <a:spAutoFit/>
+          </a:bodyPr>
+          <a:lstStyle/>
+          <a:p>
+            <a:pPr marL="285750" indent="-285750">
+              <a:buClr>
+                <a:schemeClr val="accent1"/>
+              </a:buClr>
+              <a:buFont typeface="Wingdings" panose="05000000000000000000" pitchFamily="2" charset="2"/>
+              <a:buChar char="Ø"/>
+            </a:pPr>
+            <a:r>
+              <a:rPr lang="en-GB" dirty="0"/>
+              <a:t>A positive correlation was found between the total number of medals and population</a:t>
+            </a:r>
+          </a:p>
+          <a:p>
+            <a:pPr marL="285750" indent="-285750">
+              <a:buClr>
+                <a:schemeClr val="accent1"/>
+              </a:buClr>
+              <a:buFont typeface="Wingdings" panose="05000000000000000000" pitchFamily="2" charset="2"/>
+              <a:buChar char="Ø"/>
+            </a:pPr>
+            <a:r>
+              <a:rPr lang="en-GB" dirty="0"/>
+              <a:t>Outliers are the People’s Republic of China and India</a:t>
+            </a:r>
+          </a:p>
+          <a:p>
+            <a:pPr marL="285750" indent="-285750">
+              <a:buClr>
+                <a:schemeClr val="accent1"/>
+              </a:buClr>
+              <a:buFont typeface="Wingdings" panose="05000000000000000000" pitchFamily="2" charset="2"/>
+              <a:buChar char="Ø"/>
+            </a:pPr>
+            <a:r>
+              <a:rPr lang="en-GB" dirty="0"/>
+              <a:t>Removal of these improved the correlation</a:t>
+            </a:r>
+          </a:p>
+          <a:p>
+            <a:pPr>
+              <a:buClr>
+                <a:schemeClr val="accent1"/>
+              </a:buClr>
+            </a:pPr>
+            <a:endParaRPr lang="en-GB" dirty="0">
+              <a:solidFill>
+                <a:srgbClr val="FF0000"/>
+              </a:solidFill>
+            </a:endParaRPr>
           </a:p>
         </p:txBody>
       </p:sp>
@@ -10740,7 +11055,12 @@
             <p:ph type="title"/>
           </p:nvPr>
         </p:nvSpPr>
-        <p:spPr/>
+        <p:spPr>
+          <a:xfrm>
+            <a:off x="677334" y="462120"/>
+            <a:ext cx="8596668" cy="1320800"/>
+          </a:xfrm>
+        </p:spPr>
         <p:txBody>
           <a:bodyPr/>
           <a:lstStyle/>
@@ -10784,8 +11104,8 @@
         </p:blipFill>
         <p:spPr>
           <a:xfrm>
-            <a:off x="1317519" y="1425840"/>
-            <a:ext cx="7316297" cy="4389778"/>
+            <a:off x="1843548" y="2346136"/>
+            <a:ext cx="6790268" cy="4074161"/>
           </a:xfrm>
           <a:prstGeom prst="rect">
             <a:avLst/>
@@ -10806,8 +11126,8 @@
         </p:nvSpPr>
         <p:spPr>
           <a:xfrm>
-            <a:off x="1914009" y="5815593"/>
-            <a:ext cx="2979175" cy="369332"/>
+            <a:off x="2344993" y="6437087"/>
+            <a:ext cx="3049636" cy="369332"/>
           </a:xfrm>
           <a:prstGeom prst="rect">
             <a:avLst/>
@@ -10841,8 +11161,8 @@
         </p:nvSpPr>
         <p:spPr>
           <a:xfrm>
-            <a:off x="5473286" y="5810702"/>
-            <a:ext cx="2979175" cy="369332"/>
+            <a:off x="5584181" y="6437087"/>
+            <a:ext cx="3049635" cy="369332"/>
           </a:xfrm>
           <a:prstGeom prst="rect">
             <a:avLst/>
@@ -10859,6 +11179,86 @@
               <a:rPr lang="en-GB" dirty="0"/>
               <a:t>Pearson correlation = 0.58</a:t>
             </a:r>
+          </a:p>
+        </p:txBody>
+      </p:sp>
+      <p:sp>
+        <p:nvSpPr>
+          <p:cNvPr id="7" name="TextBox 6">
+            <a:extLst>
+              <a:ext uri="{FF2B5EF4-FFF2-40B4-BE49-F238E27FC236}">
+                <a16:creationId xmlns:a16="http://schemas.microsoft.com/office/drawing/2014/main" id="{2274D262-BAA3-19BC-2116-D376EB3D6A88}"/>
+              </a:ext>
+            </a:extLst>
+          </p:cNvPr>
+          <p:cNvSpPr txBox="1"/>
+          <p:nvPr/>
+        </p:nvSpPr>
+        <p:spPr>
+          <a:xfrm>
+            <a:off x="677334" y="1237571"/>
+            <a:ext cx="8128002" cy="1477328"/>
+          </a:xfrm>
+          <a:prstGeom prst="rect">
+            <a:avLst/>
+          </a:prstGeom>
+          <a:noFill/>
+        </p:spPr>
+        <p:txBody>
+          <a:bodyPr wrap="square">
+            <a:spAutoFit/>
+          </a:bodyPr>
+          <a:lstStyle/>
+          <a:p>
+            <a:pPr marL="285750" indent="-285750">
+              <a:buClr>
+                <a:schemeClr val="accent1"/>
+              </a:buClr>
+              <a:buFont typeface="Wingdings" panose="05000000000000000000" pitchFamily="2" charset="2"/>
+              <a:buChar char="Ø"/>
+            </a:pPr>
+            <a:r>
+              <a:rPr lang="en-GB" dirty="0"/>
+              <a:t>A positive correlation was found between the total number of gold medals and population</a:t>
+            </a:r>
+          </a:p>
+          <a:p>
+            <a:pPr marL="285750" indent="-285750">
+              <a:buClr>
+                <a:schemeClr val="accent1"/>
+              </a:buClr>
+              <a:buFont typeface="Wingdings" panose="05000000000000000000" pitchFamily="2" charset="2"/>
+              <a:buChar char="Ø"/>
+            </a:pPr>
+            <a:r>
+              <a:rPr lang="en-GB" dirty="0"/>
+              <a:t>Outliers are the People’s Republic of China and India</a:t>
+            </a:r>
+          </a:p>
+          <a:p>
+            <a:pPr marL="285750" indent="-285750">
+              <a:buClr>
+                <a:schemeClr val="accent1"/>
+              </a:buClr>
+              <a:buFont typeface="Wingdings" panose="05000000000000000000" pitchFamily="2" charset="2"/>
+              <a:buChar char="Ø"/>
+            </a:pPr>
+            <a:r>
+              <a:rPr lang="en-GB" dirty="0"/>
+              <a:t>Removal of these improved the correlation</a:t>
+            </a:r>
+          </a:p>
+          <a:p>
+            <a:pPr>
+              <a:buClr>
+                <a:schemeClr val="accent1"/>
+              </a:buClr>
+            </a:pPr>
+            <a:endParaRPr lang="en-GB" dirty="0">
+              <a:solidFill>
+                <a:srgbClr val="FF0000"/>
+              </a:solidFill>
+            </a:endParaRPr>
           </a:p>
         </p:txBody>
       </p:sp>
@@ -10908,7 +11308,12 @@
             <p:ph type="title"/>
           </p:nvPr>
         </p:nvSpPr>
-        <p:spPr/>
+        <p:spPr>
+          <a:xfrm>
+            <a:off x="677334" y="462120"/>
+            <a:ext cx="8596668" cy="1320800"/>
+          </a:xfrm>
+        </p:spPr>
         <p:txBody>
           <a:bodyPr/>
           <a:lstStyle/>
@@ -10952,7 +11357,7 @@
         </p:blipFill>
         <p:spPr>
           <a:xfrm>
-            <a:off x="1264942" y="1270000"/>
+            <a:off x="1264942" y="1963174"/>
             <a:ext cx="7421451" cy="4452871"/>
           </a:xfrm>
           <a:prstGeom prst="rect">
@@ -10974,7 +11379,7 @@
         </p:nvSpPr>
         <p:spPr>
           <a:xfrm>
-            <a:off x="1958254" y="5826085"/>
+            <a:off x="1996492" y="6464064"/>
             <a:ext cx="2979175" cy="369332"/>
           </a:xfrm>
           <a:prstGeom prst="rect">
@@ -11009,7 +11414,7 @@
         </p:nvSpPr>
         <p:spPr>
           <a:xfrm>
-            <a:off x="5517531" y="5821194"/>
+            <a:off x="5517531" y="6440628"/>
             <a:ext cx="2979175" cy="369332"/>
           </a:xfrm>
           <a:prstGeom prst="rect">
@@ -11030,10 +11435,171 @@
           </a:p>
         </p:txBody>
       </p:sp>
+      <p:sp>
+        <p:nvSpPr>
+          <p:cNvPr id="3" name="TextBox 2">
+            <a:extLst>
+              <a:ext uri="{FF2B5EF4-FFF2-40B4-BE49-F238E27FC236}">
+                <a16:creationId xmlns:a16="http://schemas.microsoft.com/office/drawing/2014/main" id="{2011CD63-DF67-17FC-1233-1149873FBB7C}"/>
+              </a:ext>
+            </a:extLst>
+          </p:cNvPr>
+          <p:cNvSpPr txBox="1"/>
+          <p:nvPr/>
+        </p:nvSpPr>
+        <p:spPr>
+          <a:xfrm>
+            <a:off x="677334" y="1237571"/>
+            <a:ext cx="8128002" cy="923330"/>
+          </a:xfrm>
+          <a:prstGeom prst="rect">
+            <a:avLst/>
+          </a:prstGeom>
+          <a:noFill/>
+        </p:spPr>
+        <p:txBody>
+          <a:bodyPr wrap="square">
+            <a:spAutoFit/>
+          </a:bodyPr>
+          <a:lstStyle/>
+          <a:p>
+            <a:pPr marL="285750" indent="-285750">
+              <a:buClr>
+                <a:schemeClr val="accent1"/>
+              </a:buClr>
+              <a:buFont typeface="Wingdings" panose="05000000000000000000" pitchFamily="2" charset="2"/>
+              <a:buChar char="Ø"/>
+            </a:pPr>
+            <a:r>
+              <a:rPr lang="en-GB" dirty="0"/>
+              <a:t>A positive correlation was found between the total number of medals and gold medals and GDP </a:t>
+            </a:r>
+          </a:p>
+          <a:p>
+            <a:pPr>
+              <a:buClr>
+                <a:schemeClr val="accent1"/>
+              </a:buClr>
+            </a:pPr>
+            <a:endParaRPr lang="en-GB" dirty="0">
+              <a:solidFill>
+                <a:srgbClr val="FF0000"/>
+              </a:solidFill>
+            </a:endParaRPr>
+          </a:p>
+        </p:txBody>
+      </p:sp>
     </p:spTree>
     <p:extLst>
       <p:ext uri="{BB962C8B-B14F-4D97-AF65-F5344CB8AC3E}">
         <p14:creationId xmlns:p14="http://schemas.microsoft.com/office/powerpoint/2010/main" val="2010642056"/>
+      </p:ext>
+    </p:extLst>
+  </p:cSld>
+  <p:clrMapOvr>
+    <a:masterClrMapping/>
+  </p:clrMapOvr>
+</p:sld>
+</file>
+
+<file path=ppt/slides/slide23.xml><?xml version="1.0" encoding="utf-8"?>
+<p:sld xmlns:a="http://schemas.openxmlformats.org/drawingml/2006/main" xmlns:r="http://schemas.openxmlformats.org/officeDocument/2006/relationships" xmlns:p="http://schemas.openxmlformats.org/presentationml/2006/main">
+  <p:cSld>
+    <p:spTree>
+      <p:nvGrpSpPr>
+        <p:cNvPr id="1" name=""/>
+        <p:cNvGrpSpPr/>
+        <p:nvPr/>
+      </p:nvGrpSpPr>
+      <p:grpSpPr>
+        <a:xfrm>
+          <a:off x="0" y="0"/>
+          <a:ext cx="0" cy="0"/>
+          <a:chOff x="0" y="0"/>
+          <a:chExt cx="0" cy="0"/>
+        </a:xfrm>
+      </p:grpSpPr>
+      <p:sp>
+        <p:nvSpPr>
+          <p:cNvPr id="2" name="Title 1">
+            <a:extLst>
+              <a:ext uri="{FF2B5EF4-FFF2-40B4-BE49-F238E27FC236}">
+                <a16:creationId xmlns:a16="http://schemas.microsoft.com/office/drawing/2014/main" id="{6AA50D6C-8BF4-0119-FCC6-4E7F08C26889}"/>
+              </a:ext>
+            </a:extLst>
+          </p:cNvPr>
+          <p:cNvSpPr>
+            <a:spLocks noGrp="1"/>
+          </p:cNvSpPr>
+          <p:nvPr>
+            <p:ph type="title"/>
+          </p:nvPr>
+        </p:nvSpPr>
+        <p:spPr>
+          <a:xfrm>
+            <a:off x="677334" y="462120"/>
+            <a:ext cx="8596668" cy="1320800"/>
+          </a:xfrm>
+        </p:spPr>
+        <p:txBody>
+          <a:bodyPr/>
+          <a:lstStyle/>
+          <a:p>
+            <a:r>
+              <a:rPr lang="en-GB" dirty="0">
+                <a:solidFill>
+                  <a:schemeClr val="accent2"/>
+                </a:solidFill>
+              </a:rPr>
+              <a:t>Conclusions</a:t>
+            </a:r>
+          </a:p>
+        </p:txBody>
+      </p:sp>
+      <p:sp>
+        <p:nvSpPr>
+          <p:cNvPr id="3" name="Content Placeholder 2">
+            <a:extLst>
+              <a:ext uri="{FF2B5EF4-FFF2-40B4-BE49-F238E27FC236}">
+                <a16:creationId xmlns:a16="http://schemas.microsoft.com/office/drawing/2014/main" id="{9074B6B6-6401-62AC-569A-FC7ED8CFF8F6}"/>
+              </a:ext>
+            </a:extLst>
+          </p:cNvPr>
+          <p:cNvSpPr>
+            <a:spLocks noGrp="1"/>
+          </p:cNvSpPr>
+          <p:nvPr>
+            <p:ph idx="1"/>
+          </p:nvPr>
+        </p:nvSpPr>
+        <p:spPr/>
+        <p:txBody>
+          <a:bodyPr/>
+          <a:lstStyle/>
+          <a:p>
+            <a:r>
+              <a:rPr lang="en-GB" dirty="0"/>
+              <a:t>Different sports require different athlete biometrics</a:t>
+            </a:r>
+          </a:p>
+          <a:p>
+            <a:r>
+              <a:rPr lang="en-GB" dirty="0"/>
+              <a:t>The chance of winning a medal is increased if the Olympics is being held in your Country</a:t>
+            </a:r>
+          </a:p>
+          <a:p>
+            <a:r>
+              <a:rPr lang="en-GB" dirty="0"/>
+              <a:t>Countries with larger populations and / or GDP are more successful at winning medals.</a:t>
+            </a:r>
+          </a:p>
+        </p:txBody>
+      </p:sp>
+    </p:spTree>
+    <p:extLst>
+      <p:ext uri="{BB962C8B-B14F-4D97-AF65-F5344CB8AC3E}">
+        <p14:creationId xmlns:p14="http://schemas.microsoft.com/office/powerpoint/2010/main" val="1681688233"/>
       </p:ext>
     </p:extLst>
   </p:cSld>
@@ -11078,7 +11644,7 @@
         </p:nvSpPr>
         <p:spPr>
           <a:xfrm>
-            <a:off x="677334" y="609600"/>
+            <a:off x="677334" y="462120"/>
             <a:ext cx="8596668" cy="732503"/>
           </a:xfrm>
         </p:spPr>
@@ -11285,7 +11851,7 @@
         </p:nvSpPr>
         <p:spPr>
           <a:xfrm>
-            <a:off x="677334" y="609600"/>
+            <a:off x="677334" y="462120"/>
             <a:ext cx="8596668" cy="732503"/>
           </a:xfrm>
         </p:spPr>
@@ -11328,7 +11894,7 @@
         </p:spPr>
         <p:txBody>
           <a:bodyPr>
-            <a:normAutofit fontScale="92500"/>
+            <a:normAutofit lnSpcReduction="10000"/>
           </a:bodyPr>
           <a:lstStyle/>
           <a:p>
@@ -11355,35 +11921,44 @@
             </a:r>
           </a:p>
           <a:p>
-            <a:pPr marL="342900" lvl="0" indent="-342900">
-              <a:lnSpc>
-                <a:spcPct val="107000"/>
-              </a:lnSpc>
-              <a:buFont typeface="Symbol" panose="05050102010706020507" pitchFamily="18" charset="2"/>
-              <a:buChar char=""/>
-            </a:pPr>
-            <a:r>
-              <a:rPr lang="en-GB" sz="1800" kern="100" dirty="0">
-                <a:effectLst/>
-                <a:ea typeface="Calibri" panose="020F0502020204030204" pitchFamily="34" charset="0"/>
-                <a:cs typeface="Times New Roman" panose="02020603050405020304" pitchFamily="18" charset="0"/>
-              </a:rPr>
-              <a:t>Olympic and GDP data: Kaggle.com</a:t>
-            </a:r>
-          </a:p>
-          <a:p>
-            <a:pPr marL="342900" lvl="0" indent="-342900">
+            <a:pPr lvl="1">
               <a:lnSpc>
                 <a:spcPct val="107000"/>
               </a:lnSpc>
               <a:spcAft>
                 <a:spcPts val="800"/>
               </a:spcAft>
-              <a:buFont typeface="Symbol" panose="05050102010706020507" pitchFamily="18" charset="2"/>
-              <a:buChar char=""/>
+              <a:buFont typeface="Wingdings" panose="05000000000000000000" pitchFamily="2" charset="2"/>
+              <a:buChar char="§"/>
+              <a:tabLst>
+                <a:tab pos="3533775" algn="l"/>
+              </a:tabLst>
             </a:pPr>
             <a:r>
-              <a:rPr lang="en-GB" sz="1800" kern="100" dirty="0">
+              <a:rPr lang="en-GB" kern="100" dirty="0">
+                <a:effectLst/>
+                <a:ea typeface="Calibri" panose="020F0502020204030204" pitchFamily="34" charset="0"/>
+                <a:cs typeface="Times New Roman" panose="02020603050405020304" pitchFamily="18" charset="0"/>
+              </a:rPr>
+              <a:t>Olympic and GDP data: Kaggle.com</a:t>
+            </a:r>
+          </a:p>
+          <a:p>
+            <a:pPr lvl="1">
+              <a:lnSpc>
+                <a:spcPct val="107000"/>
+              </a:lnSpc>
+              <a:spcAft>
+                <a:spcPts val="800"/>
+              </a:spcAft>
+              <a:buFont typeface="Wingdings" panose="05000000000000000000" pitchFamily="2" charset="2"/>
+              <a:buChar char="§"/>
+              <a:tabLst>
+                <a:tab pos="3533775" algn="l"/>
+              </a:tabLst>
+            </a:pPr>
+            <a:r>
+              <a:rPr lang="en-GB" kern="100" dirty="0">
                 <a:effectLst/>
                 <a:ea typeface="Calibri" panose="020F0502020204030204" pitchFamily="34" charset="0"/>
                 <a:cs typeface="Times New Roman" panose="02020603050405020304" pitchFamily="18" charset="0"/>
@@ -11391,7 +11966,7 @@
               <a:t>Population: </a:t>
             </a:r>
             <a:r>
-              <a:rPr lang="en-GB" sz="1800" kern="100" dirty="0">
+              <a:rPr lang="en-GB" kern="100" dirty="0">
                 <a:effectLst/>
                 <a:ea typeface="Calibri" panose="020F0502020204030204" pitchFamily="34" charset="0"/>
                 <a:cs typeface="Times New Roman" panose="02020603050405020304" pitchFamily="18" charset="0"/>
@@ -11399,7 +11974,7 @@
               </a:rPr>
               <a:t>https://www.jetpunk.com/data/population/countries-by-population/</a:t>
             </a:r>
-            <a:endParaRPr lang="en-GB" sz="1800" kern="100" dirty="0">
+            <a:endParaRPr lang="en-GB" kern="100" dirty="0">
               <a:effectLst/>
               <a:ea typeface="Calibri" panose="020F0502020204030204" pitchFamily="34" charset="0"/>
               <a:cs typeface="Times New Roman" panose="02020603050405020304" pitchFamily="18" charset="0"/>
@@ -11451,7 +12026,7 @@
                 </a:highlight>
                 <a:cs typeface="Times New Roman" panose="02020603050405020304" pitchFamily="18" charset="0"/>
               </a:rPr>
-              <a:t>The data was reduced to 2004 to 2016. This was because of a large amount of missing data prior to 2004 and also the pandemic in 2020 affecting data collection and Olympians ability to take part.</a:t>
+              <a:t>The data was reduced to between 2004 and 2016 as there is a large amount of missing data prior to 2004. In addition, the COVID pandemic in 2020 affected data collection</a:t>
             </a:r>
           </a:p>
           <a:p>
@@ -11476,7 +12051,7 @@
                 </a:highlight>
                 <a:cs typeface="Times New Roman" panose="02020603050405020304" pitchFamily="18" charset="0"/>
               </a:rPr>
-              <a:t>The data was also reduced to male athletes only due to the large differences in male and female biometrics impacting on the variability.</a:t>
+              <a:t>The data was also reduced to male athletes only due to the large differences in male and female biometrics creating greater variability</a:t>
             </a:r>
             <a:endParaRPr lang="en-GB" b="0" i="0" dirty="0">
               <a:solidFill>
@@ -11541,7 +12116,7 @@
         </p:nvSpPr>
         <p:spPr>
           <a:xfrm>
-            <a:off x="677334" y="609600"/>
+            <a:off x="677334" y="462120"/>
             <a:ext cx="8596668" cy="879013"/>
           </a:xfrm>
         </p:spPr>
@@ -11590,7 +12165,7 @@
           <a:p>
             <a:r>
               <a:rPr lang="en-GB" dirty="0"/>
-              <a:t>The following table highlights the biometrics of the competitors</a:t>
+              <a:t>The following table highlights the biometrics stats of the competitors</a:t>
             </a:r>
           </a:p>
           <a:p>
@@ -12182,7 +12757,7 @@
         </p:nvSpPr>
         <p:spPr>
           <a:xfrm>
-            <a:off x="677334" y="609600"/>
+            <a:off x="677334" y="462120"/>
             <a:ext cx="8596668" cy="806245"/>
           </a:xfrm>
         </p:spPr>
@@ -12196,7 +12771,7 @@
                   <a:schemeClr val="accent2"/>
                 </a:solidFill>
               </a:rPr>
-              <a:t>Olympians’ biometrics</a:t>
+              <a:t>Olympians’ biometrics - distribution</a:t>
             </a:r>
           </a:p>
         </p:txBody>
@@ -12282,24 +12857,24 @@
             <p:ph type="title"/>
           </p:nvPr>
         </p:nvSpPr>
-        <p:spPr/>
+        <p:spPr>
+          <a:xfrm>
+            <a:off x="677334" y="462120"/>
+            <a:ext cx="8596668" cy="1320800"/>
+          </a:xfrm>
+        </p:spPr>
         <p:txBody>
           <a:bodyPr/>
           <a:lstStyle/>
           <a:p>
             <a:r>
-              <a:rPr lang="en-GB">
+              <a:rPr lang="en-GB" dirty="0">
                 <a:solidFill>
                   <a:schemeClr val="accent2"/>
                 </a:solidFill>
               </a:rPr>
               <a:t>Eventing</a:t>
             </a:r>
-            <a:endParaRPr lang="en-GB" dirty="0">
-              <a:solidFill>
-                <a:schemeClr val="accent2"/>
-              </a:solidFill>
-            </a:endParaRPr>
           </a:p>
         </p:txBody>
       </p:sp>
@@ -13086,7 +13661,7 @@
         <p:spPr>
           <a:xfrm>
             <a:off x="806789" y="4048269"/>
-            <a:ext cx="6098458" cy="646331"/>
+            <a:ext cx="8128002" cy="1200329"/>
           </a:xfrm>
           <a:prstGeom prst="rect">
             <a:avLst/>
@@ -13107,12 +13682,21 @@
               <a:buChar char="Ø"/>
             </a:pPr>
             <a:r>
-              <a:rPr lang="en-GB" dirty="0">
-                <a:solidFill>
-                  <a:srgbClr val="FF0000"/>
-                </a:solidFill>
-              </a:rPr>
-              <a:t>The following table highlights the biometrics of the competitors</a:t>
+              <a:rPr lang="en-GB" dirty="0"/>
+              <a:t>Statistical analysis showed that the competitors in eventing were older and lighter than the average Olympian with a lower BMI</a:t>
+            </a:r>
+          </a:p>
+          <a:p>
+            <a:pPr marL="285750" indent="-285750">
+              <a:buClr>
+                <a:schemeClr val="accent1"/>
+              </a:buClr>
+              <a:buFont typeface="Wingdings" panose="05000000000000000000" pitchFamily="2" charset="2"/>
+              <a:buChar char="Ø"/>
+            </a:pPr>
+            <a:r>
+              <a:rPr lang="en-GB" dirty="0"/>
+              <a:t>This is likely due to eventing requiring a wide depth of knowledge, that comes with age and experience, rather than speed or strength</a:t>
             </a:r>
           </a:p>
         </p:txBody>
@@ -13163,24 +13747,24 @@
             <p:ph type="title"/>
           </p:nvPr>
         </p:nvSpPr>
-        <p:spPr/>
+        <p:spPr>
+          <a:xfrm>
+            <a:off x="677334" y="462120"/>
+            <a:ext cx="8596668" cy="1320800"/>
+          </a:xfrm>
+        </p:spPr>
         <p:txBody>
           <a:bodyPr/>
           <a:lstStyle/>
           <a:p>
             <a:r>
-              <a:rPr lang="en-GB">
+              <a:rPr lang="en-GB" dirty="0">
                 <a:solidFill>
                   <a:schemeClr val="accent2"/>
                 </a:solidFill>
               </a:rPr>
               <a:t>Eventing</a:t>
             </a:r>
-            <a:endParaRPr lang="en-GB" dirty="0">
-              <a:solidFill>
-                <a:schemeClr val="accent2"/>
-              </a:solidFill>
-            </a:endParaRPr>
           </a:p>
         </p:txBody>
       </p:sp>
@@ -13266,7 +13850,12 @@
             <p:ph type="title"/>
           </p:nvPr>
         </p:nvSpPr>
-        <p:spPr/>
+        <p:spPr>
+          <a:xfrm>
+            <a:off x="677334" y="462120"/>
+            <a:ext cx="8596668" cy="1320800"/>
+          </a:xfrm>
+        </p:spPr>
         <p:txBody>
           <a:bodyPr/>
           <a:lstStyle/>
@@ -14065,7 +14654,7 @@
         <p:spPr>
           <a:xfrm>
             <a:off x="806789" y="4048269"/>
-            <a:ext cx="6098458" cy="646331"/>
+            <a:ext cx="8128002" cy="646331"/>
           </a:xfrm>
           <a:prstGeom prst="rect">
             <a:avLst/>
@@ -14086,12 +14675,8 @@
               <a:buChar char="Ø"/>
             </a:pPr>
             <a:r>
-              <a:rPr lang="en-GB" dirty="0">
-                <a:solidFill>
-                  <a:srgbClr val="FF0000"/>
-                </a:solidFill>
-              </a:rPr>
-              <a:t>The following table highlights the biometrics of the competitors</a:t>
+              <a:rPr lang="en-GB" dirty="0"/>
+              <a:t>Participants in the men’s 100 m were found to be statistically younger and shorter than the average Olympian</a:t>
             </a:r>
           </a:p>
         </p:txBody>

</xml_diff>